<commit_message>
Added hints to all of Cross Wordle
</commit_message>
<xml_diff>
--- a/projects/crosswordle2/CrossWordle Presentation.pptx
+++ b/projects/crosswordle2/CrossWordle Presentation.pptx
@@ -4,6 +4,9 @@
   <p:sldMasterIdLst>
     <p:sldMasterId id="2147483648" r:id="rId1"/>
   </p:sldMasterIdLst>
+  <p:notesMasterIdLst>
+    <p:notesMasterId r:id="rId18"/>
+  </p:notesMasterIdLst>
   <p:sldIdLst>
     <p:sldId id="256" r:id="rId2"/>
     <p:sldId id="257" r:id="rId3"/>
@@ -127,6 +130,439 @@
 </p:presentation>
 </file>
 
+<file path=ppt/notesMasters/notesMaster1.xml><?xml version="1.0" encoding="utf-8"?>
+<p:notesMaster xmlns:a="http://schemas.openxmlformats.org/drawingml/2006/main" xmlns:r="http://schemas.openxmlformats.org/officeDocument/2006/relationships" xmlns:p="http://schemas.openxmlformats.org/presentationml/2006/main">
+  <p:cSld>
+    <p:bg>
+      <p:bgRef idx="1001">
+        <a:schemeClr val="bg1"/>
+      </p:bgRef>
+    </p:bg>
+    <p:spTree>
+      <p:nvGrpSpPr>
+        <p:cNvPr id="1" name=""/>
+        <p:cNvGrpSpPr/>
+        <p:nvPr/>
+      </p:nvGrpSpPr>
+      <p:grpSpPr>
+        <a:xfrm>
+          <a:off x="0" y="0"/>
+          <a:ext cx="0" cy="0"/>
+          <a:chOff x="0" y="0"/>
+          <a:chExt cx="0" cy="0"/>
+        </a:xfrm>
+      </p:grpSpPr>
+      <p:sp>
+        <p:nvSpPr>
+          <p:cNvPr id="2" name="Header Placeholder 1"/>
+          <p:cNvSpPr>
+            <a:spLocks noGrp="1"/>
+          </p:cNvSpPr>
+          <p:nvPr>
+            <p:ph type="hdr" sz="quarter"/>
+          </p:nvPr>
+        </p:nvSpPr>
+        <p:spPr>
+          <a:xfrm>
+            <a:off x="0" y="0"/>
+            <a:ext cx="2971800" cy="458788"/>
+          </a:xfrm>
+          <a:prstGeom prst="rect">
+            <a:avLst/>
+          </a:prstGeom>
+        </p:spPr>
+        <p:txBody>
+          <a:bodyPr vert="horz" lIns="91440" tIns="45720" rIns="91440" bIns="45720" rtlCol="0"/>
+          <a:lstStyle>
+            <a:lvl1pPr algn="l">
+              <a:defRPr sz="1200"/>
+            </a:lvl1pPr>
+          </a:lstStyle>
+          <a:p>
+            <a:endParaRPr lang="en-US"/>
+          </a:p>
+        </p:txBody>
+      </p:sp>
+      <p:sp>
+        <p:nvSpPr>
+          <p:cNvPr id="3" name="Date Placeholder 2"/>
+          <p:cNvSpPr>
+            <a:spLocks noGrp="1"/>
+          </p:cNvSpPr>
+          <p:nvPr>
+            <p:ph type="dt" idx="1"/>
+          </p:nvPr>
+        </p:nvSpPr>
+        <p:spPr>
+          <a:xfrm>
+            <a:off x="3884613" y="0"/>
+            <a:ext cx="2971800" cy="458788"/>
+          </a:xfrm>
+          <a:prstGeom prst="rect">
+            <a:avLst/>
+          </a:prstGeom>
+        </p:spPr>
+        <p:txBody>
+          <a:bodyPr vert="horz" lIns="91440" tIns="45720" rIns="91440" bIns="45720" rtlCol="0"/>
+          <a:lstStyle>
+            <a:lvl1pPr algn="r">
+              <a:defRPr sz="1200"/>
+            </a:lvl1pPr>
+          </a:lstStyle>
+          <a:p>
+            <a:fld id="{2F4773D6-586D-CC45-9097-85C9C8AD8DB1}" type="datetimeFigureOut">
+              <a:rPr lang="en-US" smtClean="0"/>
+              <a:t>6/23/23</a:t>
+            </a:fld>
+            <a:endParaRPr lang="en-US"/>
+          </a:p>
+        </p:txBody>
+      </p:sp>
+      <p:sp>
+        <p:nvSpPr>
+          <p:cNvPr id="4" name="Slide Image Placeholder 3"/>
+          <p:cNvSpPr>
+            <a:spLocks noGrp="1" noRot="1" noChangeAspect="1"/>
+          </p:cNvSpPr>
+          <p:nvPr>
+            <p:ph type="sldImg" idx="2"/>
+          </p:nvPr>
+        </p:nvSpPr>
+        <p:spPr>
+          <a:xfrm>
+            <a:off x="685800" y="1143000"/>
+            <a:ext cx="5486400" cy="3086100"/>
+          </a:xfrm>
+          <a:prstGeom prst="rect">
+            <a:avLst/>
+          </a:prstGeom>
+          <a:noFill/>
+          <a:ln w="12700">
+            <a:solidFill>
+              <a:prstClr val="black"/>
+            </a:solidFill>
+          </a:ln>
+        </p:spPr>
+        <p:txBody>
+          <a:bodyPr vert="horz" lIns="91440" tIns="45720" rIns="91440" bIns="45720" rtlCol="0" anchor="ctr"/>
+          <a:lstStyle/>
+          <a:p>
+            <a:endParaRPr lang="en-US"/>
+          </a:p>
+        </p:txBody>
+      </p:sp>
+      <p:sp>
+        <p:nvSpPr>
+          <p:cNvPr id="5" name="Notes Placeholder 4"/>
+          <p:cNvSpPr>
+            <a:spLocks noGrp="1"/>
+          </p:cNvSpPr>
+          <p:nvPr>
+            <p:ph type="body" sz="quarter" idx="3"/>
+          </p:nvPr>
+        </p:nvSpPr>
+        <p:spPr>
+          <a:xfrm>
+            <a:off x="685800" y="4400550"/>
+            <a:ext cx="5486400" cy="3600450"/>
+          </a:xfrm>
+          <a:prstGeom prst="rect">
+            <a:avLst/>
+          </a:prstGeom>
+        </p:spPr>
+        <p:txBody>
+          <a:bodyPr vert="horz" lIns="91440" tIns="45720" rIns="91440" bIns="45720" rtlCol="0"/>
+          <a:lstStyle/>
+          <a:p>
+            <a:pPr lvl="0"/>
+            <a:r>
+              <a:rPr lang="en-US"/>
+              <a:t>Click to edit Master text styles</a:t>
+            </a:r>
+          </a:p>
+          <a:p>
+            <a:pPr lvl="1"/>
+            <a:r>
+              <a:rPr lang="en-US"/>
+              <a:t>Second level</a:t>
+            </a:r>
+          </a:p>
+          <a:p>
+            <a:pPr lvl="2"/>
+            <a:r>
+              <a:rPr lang="en-US"/>
+              <a:t>Third level</a:t>
+            </a:r>
+          </a:p>
+          <a:p>
+            <a:pPr lvl="3"/>
+            <a:r>
+              <a:rPr lang="en-US"/>
+              <a:t>Fourth level</a:t>
+            </a:r>
+          </a:p>
+          <a:p>
+            <a:pPr lvl="4"/>
+            <a:r>
+              <a:rPr lang="en-US"/>
+              <a:t>Fifth level</a:t>
+            </a:r>
+          </a:p>
+        </p:txBody>
+      </p:sp>
+      <p:sp>
+        <p:nvSpPr>
+          <p:cNvPr id="6" name="Footer Placeholder 5"/>
+          <p:cNvSpPr>
+            <a:spLocks noGrp="1"/>
+          </p:cNvSpPr>
+          <p:nvPr>
+            <p:ph type="ftr" sz="quarter" idx="4"/>
+          </p:nvPr>
+        </p:nvSpPr>
+        <p:spPr>
+          <a:xfrm>
+            <a:off x="0" y="8685213"/>
+            <a:ext cx="2971800" cy="458787"/>
+          </a:xfrm>
+          <a:prstGeom prst="rect">
+            <a:avLst/>
+          </a:prstGeom>
+        </p:spPr>
+        <p:txBody>
+          <a:bodyPr vert="horz" lIns="91440" tIns="45720" rIns="91440" bIns="45720" rtlCol="0" anchor="b"/>
+          <a:lstStyle>
+            <a:lvl1pPr algn="l">
+              <a:defRPr sz="1200"/>
+            </a:lvl1pPr>
+          </a:lstStyle>
+          <a:p>
+            <a:endParaRPr lang="en-US"/>
+          </a:p>
+        </p:txBody>
+      </p:sp>
+      <p:sp>
+        <p:nvSpPr>
+          <p:cNvPr id="7" name="Slide Number Placeholder 6"/>
+          <p:cNvSpPr>
+            <a:spLocks noGrp="1"/>
+          </p:cNvSpPr>
+          <p:nvPr>
+            <p:ph type="sldNum" sz="quarter" idx="5"/>
+          </p:nvPr>
+        </p:nvSpPr>
+        <p:spPr>
+          <a:xfrm>
+            <a:off x="3884613" y="8685213"/>
+            <a:ext cx="2971800" cy="458787"/>
+          </a:xfrm>
+          <a:prstGeom prst="rect">
+            <a:avLst/>
+          </a:prstGeom>
+        </p:spPr>
+        <p:txBody>
+          <a:bodyPr vert="horz" lIns="91440" tIns="45720" rIns="91440" bIns="45720" rtlCol="0" anchor="b"/>
+          <a:lstStyle>
+            <a:lvl1pPr algn="r">
+              <a:defRPr sz="1200"/>
+            </a:lvl1pPr>
+          </a:lstStyle>
+          <a:p>
+            <a:fld id="{0C2C39D3-2F3B-D240-BB3D-AF8E165C59BE}" type="slidenum">
+              <a:rPr lang="en-US" smtClean="0"/>
+              <a:t>‹#›</a:t>
+            </a:fld>
+            <a:endParaRPr lang="en-US"/>
+          </a:p>
+        </p:txBody>
+      </p:sp>
+    </p:spTree>
+    <p:extLst>
+      <p:ext uri="{BB962C8B-B14F-4D97-AF65-F5344CB8AC3E}">
+        <p14:creationId xmlns:p14="http://schemas.microsoft.com/office/powerpoint/2010/main" val="2969479114"/>
+      </p:ext>
+    </p:extLst>
+  </p:cSld>
+  <p:clrMap bg1="lt1" tx1="dk1" bg2="lt2" tx2="dk2" accent1="accent1" accent2="accent2" accent3="accent3" accent4="accent4" accent5="accent5" accent6="accent6" hlink="hlink" folHlink="folHlink"/>
+  <p:notesStyle>
+    <a:lvl1pPr marL="0" algn="l" defTabSz="914400" rtl="0" eaLnBrk="1" latinLnBrk="0" hangingPunct="1">
+      <a:defRPr sz="1200" kern="1200">
+        <a:solidFill>
+          <a:schemeClr val="tx1"/>
+        </a:solidFill>
+        <a:latin typeface="+mn-lt"/>
+        <a:ea typeface="+mn-ea"/>
+        <a:cs typeface="+mn-cs"/>
+      </a:defRPr>
+    </a:lvl1pPr>
+    <a:lvl2pPr marL="457200" algn="l" defTabSz="914400" rtl="0" eaLnBrk="1" latinLnBrk="0" hangingPunct="1">
+      <a:defRPr sz="1200" kern="1200">
+        <a:solidFill>
+          <a:schemeClr val="tx1"/>
+        </a:solidFill>
+        <a:latin typeface="+mn-lt"/>
+        <a:ea typeface="+mn-ea"/>
+        <a:cs typeface="+mn-cs"/>
+      </a:defRPr>
+    </a:lvl2pPr>
+    <a:lvl3pPr marL="914400" algn="l" defTabSz="914400" rtl="0" eaLnBrk="1" latinLnBrk="0" hangingPunct="1">
+      <a:defRPr sz="1200" kern="1200">
+        <a:solidFill>
+          <a:schemeClr val="tx1"/>
+        </a:solidFill>
+        <a:latin typeface="+mn-lt"/>
+        <a:ea typeface="+mn-ea"/>
+        <a:cs typeface="+mn-cs"/>
+      </a:defRPr>
+    </a:lvl3pPr>
+    <a:lvl4pPr marL="1371600" algn="l" defTabSz="914400" rtl="0" eaLnBrk="1" latinLnBrk="0" hangingPunct="1">
+      <a:defRPr sz="1200" kern="1200">
+        <a:solidFill>
+          <a:schemeClr val="tx1"/>
+        </a:solidFill>
+        <a:latin typeface="+mn-lt"/>
+        <a:ea typeface="+mn-ea"/>
+        <a:cs typeface="+mn-cs"/>
+      </a:defRPr>
+    </a:lvl4pPr>
+    <a:lvl5pPr marL="1828800" algn="l" defTabSz="914400" rtl="0" eaLnBrk="1" latinLnBrk="0" hangingPunct="1">
+      <a:defRPr sz="1200" kern="1200">
+        <a:solidFill>
+          <a:schemeClr val="tx1"/>
+        </a:solidFill>
+        <a:latin typeface="+mn-lt"/>
+        <a:ea typeface="+mn-ea"/>
+        <a:cs typeface="+mn-cs"/>
+      </a:defRPr>
+    </a:lvl5pPr>
+    <a:lvl6pPr marL="2286000" algn="l" defTabSz="914400" rtl="0" eaLnBrk="1" latinLnBrk="0" hangingPunct="1">
+      <a:defRPr sz="1200" kern="1200">
+        <a:solidFill>
+          <a:schemeClr val="tx1"/>
+        </a:solidFill>
+        <a:latin typeface="+mn-lt"/>
+        <a:ea typeface="+mn-ea"/>
+        <a:cs typeface="+mn-cs"/>
+      </a:defRPr>
+    </a:lvl6pPr>
+    <a:lvl7pPr marL="2743200" algn="l" defTabSz="914400" rtl="0" eaLnBrk="1" latinLnBrk="0" hangingPunct="1">
+      <a:defRPr sz="1200" kern="1200">
+        <a:solidFill>
+          <a:schemeClr val="tx1"/>
+        </a:solidFill>
+        <a:latin typeface="+mn-lt"/>
+        <a:ea typeface="+mn-ea"/>
+        <a:cs typeface="+mn-cs"/>
+      </a:defRPr>
+    </a:lvl7pPr>
+    <a:lvl8pPr marL="3200400" algn="l" defTabSz="914400" rtl="0" eaLnBrk="1" latinLnBrk="0" hangingPunct="1">
+      <a:defRPr sz="1200" kern="1200">
+        <a:solidFill>
+          <a:schemeClr val="tx1"/>
+        </a:solidFill>
+        <a:latin typeface="+mn-lt"/>
+        <a:ea typeface="+mn-ea"/>
+        <a:cs typeface="+mn-cs"/>
+      </a:defRPr>
+    </a:lvl8pPr>
+    <a:lvl9pPr marL="3657600" algn="l" defTabSz="914400" rtl="0" eaLnBrk="1" latinLnBrk="0" hangingPunct="1">
+      <a:defRPr sz="1200" kern="1200">
+        <a:solidFill>
+          <a:schemeClr val="tx1"/>
+        </a:solidFill>
+        <a:latin typeface="+mn-lt"/>
+        <a:ea typeface="+mn-ea"/>
+        <a:cs typeface="+mn-cs"/>
+      </a:defRPr>
+    </a:lvl9pPr>
+  </p:notesStyle>
+</p:notesMaster>
+</file>
+
+<file path=ppt/notesSlides/notesSlide1.xml><?xml version="1.0" encoding="utf-8"?>
+<p:notes xmlns:a="http://schemas.openxmlformats.org/drawingml/2006/main" xmlns:r="http://schemas.openxmlformats.org/officeDocument/2006/relationships" xmlns:p="http://schemas.openxmlformats.org/presentationml/2006/main">
+  <p:cSld>
+    <p:spTree>
+      <p:nvGrpSpPr>
+        <p:cNvPr id="1" name=""/>
+        <p:cNvGrpSpPr/>
+        <p:nvPr/>
+      </p:nvGrpSpPr>
+      <p:grpSpPr>
+        <a:xfrm>
+          <a:off x="0" y="0"/>
+          <a:ext cx="0" cy="0"/>
+          <a:chOff x="0" y="0"/>
+          <a:chExt cx="0" cy="0"/>
+        </a:xfrm>
+      </p:grpSpPr>
+      <p:sp>
+        <p:nvSpPr>
+          <p:cNvPr id="2" name="Slide Image Placeholder 1"/>
+          <p:cNvSpPr>
+            <a:spLocks noGrp="1" noRot="1" noChangeAspect="1"/>
+          </p:cNvSpPr>
+          <p:nvPr>
+            <p:ph type="sldImg"/>
+          </p:nvPr>
+        </p:nvSpPr>
+        <p:spPr/>
+      </p:sp>
+      <p:sp>
+        <p:nvSpPr>
+          <p:cNvPr id="3" name="Notes Placeholder 2"/>
+          <p:cNvSpPr>
+            <a:spLocks noGrp="1"/>
+          </p:cNvSpPr>
+          <p:nvPr>
+            <p:ph type="body" idx="1"/>
+          </p:nvPr>
+        </p:nvSpPr>
+        <p:spPr/>
+        <p:txBody>
+          <a:bodyPr/>
+          <a:lstStyle/>
+          <a:p>
+            <a:endParaRPr lang="en-US" dirty="0"/>
+          </a:p>
+        </p:txBody>
+      </p:sp>
+      <p:sp>
+        <p:nvSpPr>
+          <p:cNvPr id="4" name="Slide Number Placeholder 3"/>
+          <p:cNvSpPr>
+            <a:spLocks noGrp="1"/>
+          </p:cNvSpPr>
+          <p:nvPr>
+            <p:ph type="sldNum" sz="quarter" idx="5"/>
+          </p:nvPr>
+        </p:nvSpPr>
+        <p:spPr/>
+        <p:txBody>
+          <a:bodyPr/>
+          <a:lstStyle/>
+          <a:p>
+            <a:fld id="{0C2C39D3-2F3B-D240-BB3D-AF8E165C59BE}" type="slidenum">
+              <a:rPr lang="en-US" smtClean="0"/>
+              <a:t>1</a:t>
+            </a:fld>
+            <a:endParaRPr lang="en-US"/>
+          </a:p>
+        </p:txBody>
+      </p:sp>
+    </p:spTree>
+    <p:extLst>
+      <p:ext uri="{BB962C8B-B14F-4D97-AF65-F5344CB8AC3E}">
+        <p14:creationId xmlns:p14="http://schemas.microsoft.com/office/powerpoint/2010/main" val="328093583"/>
+      </p:ext>
+    </p:extLst>
+  </p:cSld>
+  <p:clrMapOvr>
+    <a:masterClrMapping/>
+  </p:clrMapOvr>
+</p:notes>
+</file>
+
 <file path=ppt/slideLayouts/slideLayout1.xml><?xml version="1.0" encoding="utf-8"?>
 <p:sldLayout xmlns:a="http://schemas.openxmlformats.org/drawingml/2006/main" xmlns:r="http://schemas.openxmlformats.org/officeDocument/2006/relationships" xmlns:p="http://schemas.openxmlformats.org/presentationml/2006/main" type="title" preserve="1">
   <p:cSld name="Title Slide">
@@ -274,7 +710,7 @@
           <a:p>
             <a:fld id="{965FD8D6-C471-4C27-8953-0AF5992EEF52}" type="datetimeFigureOut">
               <a:rPr lang="en-US" smtClean="0"/>
-              <a:t>6/22/2023</a:t>
+              <a:t>6/23/23</a:t>
             </a:fld>
             <a:endParaRPr lang="en-US"/>
           </a:p>
@@ -472,7 +908,7 @@
           <a:p>
             <a:fld id="{965FD8D6-C471-4C27-8953-0AF5992EEF52}" type="datetimeFigureOut">
               <a:rPr lang="en-US" smtClean="0"/>
-              <a:t>6/22/2023</a:t>
+              <a:t>6/23/23</a:t>
             </a:fld>
             <a:endParaRPr lang="en-US"/>
           </a:p>
@@ -680,7 +1116,7 @@
           <a:p>
             <a:fld id="{965FD8D6-C471-4C27-8953-0AF5992EEF52}" type="datetimeFigureOut">
               <a:rPr lang="en-US" smtClean="0"/>
-              <a:t>6/22/2023</a:t>
+              <a:t>6/23/23</a:t>
             </a:fld>
             <a:endParaRPr lang="en-US"/>
           </a:p>
@@ -878,7 +1314,7 @@
           <a:p>
             <a:fld id="{965FD8D6-C471-4C27-8953-0AF5992EEF52}" type="datetimeFigureOut">
               <a:rPr lang="en-US" smtClean="0"/>
-              <a:t>6/22/2023</a:t>
+              <a:t>6/23/23</a:t>
             </a:fld>
             <a:endParaRPr lang="en-US"/>
           </a:p>
@@ -1153,7 +1589,7 @@
           <a:p>
             <a:fld id="{965FD8D6-C471-4C27-8953-0AF5992EEF52}" type="datetimeFigureOut">
               <a:rPr lang="en-US" smtClean="0"/>
-              <a:t>6/22/2023</a:t>
+              <a:t>6/23/23</a:t>
             </a:fld>
             <a:endParaRPr lang="en-US"/>
           </a:p>
@@ -1418,7 +1854,7 @@
           <a:p>
             <a:fld id="{965FD8D6-C471-4C27-8953-0AF5992EEF52}" type="datetimeFigureOut">
               <a:rPr lang="en-US" smtClean="0"/>
-              <a:t>6/22/2023</a:t>
+              <a:t>6/23/23</a:t>
             </a:fld>
             <a:endParaRPr lang="en-US"/>
           </a:p>
@@ -1830,7 +2266,7 @@
           <a:p>
             <a:fld id="{965FD8D6-C471-4C27-8953-0AF5992EEF52}" type="datetimeFigureOut">
               <a:rPr lang="en-US" smtClean="0"/>
-              <a:t>6/22/2023</a:t>
+              <a:t>6/23/23</a:t>
             </a:fld>
             <a:endParaRPr lang="en-US"/>
           </a:p>
@@ -1971,7 +2407,7 @@
           <a:p>
             <a:fld id="{965FD8D6-C471-4C27-8953-0AF5992EEF52}" type="datetimeFigureOut">
               <a:rPr lang="en-US" smtClean="0"/>
-              <a:t>6/22/2023</a:t>
+              <a:t>6/23/23</a:t>
             </a:fld>
             <a:endParaRPr lang="en-US"/>
           </a:p>
@@ -2084,7 +2520,7 @@
           <a:p>
             <a:fld id="{965FD8D6-C471-4C27-8953-0AF5992EEF52}" type="datetimeFigureOut">
               <a:rPr lang="en-US" smtClean="0"/>
-              <a:t>6/22/2023</a:t>
+              <a:t>6/23/23</a:t>
             </a:fld>
             <a:endParaRPr lang="en-US"/>
           </a:p>
@@ -2395,7 +2831,7 @@
           <a:p>
             <a:fld id="{965FD8D6-C471-4C27-8953-0AF5992EEF52}" type="datetimeFigureOut">
               <a:rPr lang="en-US" smtClean="0"/>
-              <a:t>6/22/2023</a:t>
+              <a:t>6/23/23</a:t>
             </a:fld>
             <a:endParaRPr lang="en-US"/>
           </a:p>
@@ -2683,7 +3119,7 @@
           <a:p>
             <a:fld id="{965FD8D6-C471-4C27-8953-0AF5992EEF52}" type="datetimeFigureOut">
               <a:rPr lang="en-US" smtClean="0"/>
-              <a:t>6/22/2023</a:t>
+              <a:t>6/23/23</a:t>
             </a:fld>
             <a:endParaRPr lang="en-US"/>
           </a:p>
@@ -2924,7 +3360,7 @@
           <a:p>
             <a:fld id="{965FD8D6-C471-4C27-8953-0AF5992EEF52}" type="datetimeFigureOut">
               <a:rPr lang="en-US" smtClean="0"/>
-              <a:t>6/22/2023</a:t>
+              <a:t>6/23/23</a:t>
             </a:fld>
             <a:endParaRPr lang="en-US"/>
           </a:p>
@@ -3493,7 +3929,7 @@
                 <a:latin typeface="Cambria" panose="02040503050406030204" pitchFamily="18" charset="0"/>
                 <a:ea typeface="Cambria" panose="02040503050406030204" pitchFamily="18" charset="0"/>
               </a:rPr>
-              <a:t>A word game by Matteo Salverio</a:t>
+              <a:t>A Word Game by Matteo Salverio</a:t>
             </a:r>
           </a:p>
         </p:txBody>
@@ -4342,7 +4778,7 @@
           <p:nvPr/>
         </p:nvPicPr>
         <p:blipFill rotWithShape="1">
-          <a:blip r:embed="rId2"/>
+          <a:blip r:embed="rId3"/>
           <a:srcRect l="17638" t="6418" r="17431" b="14769"/>
           <a:stretch/>
         </p:blipFill>
@@ -6463,7 +6899,7 @@
                 <a:latin typeface="Cambria" panose="02040503050406030204" pitchFamily="18" charset="0"/>
                 <a:ea typeface="Cambria" panose="02040503050406030204" pitchFamily="18" charset="0"/>
               </a:rPr>
-              <a:t>I went through many design variations for this game, but ended up going with a simplistic, yet </a:t>
+              <a:t>Simplistic, yet </a:t>
             </a:r>
             <a:r>
               <a:rPr lang="en-US" sz="2600" dirty="0">
@@ -6487,6 +6923,15 @@
             </a:r>
           </a:p>
           <a:p>
+            <a:endParaRPr lang="en-US" sz="2600" dirty="0">
+              <a:solidFill>
+                <a:schemeClr val="bg1"/>
+              </a:solidFill>
+              <a:latin typeface="Cambria" panose="02040503050406030204" pitchFamily="18" charset="0"/>
+              <a:ea typeface="Cambria" panose="02040503050406030204" pitchFamily="18" charset="0"/>
+            </a:endParaRPr>
+          </a:p>
+          <a:p>
             <a:r>
               <a:rPr lang="en-US" sz="2600" dirty="0">
                 <a:solidFill>
@@ -6495,7 +6940,7 @@
                 <a:latin typeface="Cambria" panose="02040503050406030204" pitchFamily="18" charset="0"/>
                 <a:ea typeface="Cambria" panose="02040503050406030204" pitchFamily="18" charset="0"/>
               </a:rPr>
-              <a:t>Bland background color makes the letter spaces </a:t>
+              <a:t>Neutral background color makes the letter spaces </a:t>
             </a:r>
             <a:r>
               <a:rPr lang="en-US" sz="2600" dirty="0">
@@ -6559,6 +7004,15 @@
             </a:r>
           </a:p>
           <a:p>
+            <a:endParaRPr lang="en-US" sz="2600" dirty="0">
+              <a:solidFill>
+                <a:schemeClr val="bg1"/>
+              </a:solidFill>
+              <a:latin typeface="Cambria" panose="02040503050406030204" pitchFamily="18" charset="0"/>
+              <a:ea typeface="Cambria" panose="02040503050406030204" pitchFamily="18" charset="0"/>
+            </a:endParaRPr>
+          </a:p>
+          <a:p>
             <a:r>
               <a:rPr lang="en-US" sz="2600" dirty="0">
                 <a:solidFill>
@@ -6567,7 +7021,7 @@
                 <a:latin typeface="Cambria" panose="02040503050406030204" pitchFamily="18" charset="0"/>
                 <a:ea typeface="Cambria" panose="02040503050406030204" pitchFamily="18" charset="0"/>
               </a:rPr>
-              <a:t>Simple design allows for better focus</a:t>
+              <a:t>Simple design allows for better focus.</a:t>
             </a:r>
           </a:p>
         </p:txBody>
@@ -11887,7 +12341,7 @@
                 <a:latin typeface="Cambria" panose="02040503050406030204" pitchFamily="18" charset="0"/>
                 <a:ea typeface="Cambria" panose="02040503050406030204" pitchFamily="18" charset="0"/>
               </a:rPr>
-              <a:t> and submitted as a guess.</a:t>
+              <a:t> and submitted as an attempt.</a:t>
             </a:r>
           </a:p>
           <a:p>
@@ -11961,7 +12415,7 @@
                 <a:latin typeface="Cambria" panose="02040503050406030204" pitchFamily="18" charset="0"/>
                 <a:ea typeface="Cambria" panose="02040503050406030204" pitchFamily="18" charset="0"/>
               </a:rPr>
-              <a:t>The player doesn’t have to remember what they’ve already found.</a:t>
+              <a:t>The player does not have to remember what they have already found.</a:t>
             </a:r>
           </a:p>
         </p:txBody>
@@ -13334,4 +13788,299 @@
     </a:ext>
   </a:extLst>
 </a:theme>
+</file>
+
+<file path=ppt/theme/theme2.xml><?xml version="1.0" encoding="utf-8"?>
+<a:theme xmlns:a="http://schemas.openxmlformats.org/drawingml/2006/main" name="Office Theme">
+  <a:themeElements>
+    <a:clrScheme name="Office">
+      <a:dk1>
+        <a:sysClr val="windowText" lastClr="000000"/>
+      </a:dk1>
+      <a:lt1>
+        <a:sysClr val="window" lastClr="FFFFFF"/>
+      </a:lt1>
+      <a:dk2>
+        <a:srgbClr val="44546A"/>
+      </a:dk2>
+      <a:lt2>
+        <a:srgbClr val="E7E6E6"/>
+      </a:lt2>
+      <a:accent1>
+        <a:srgbClr val="4472C4"/>
+      </a:accent1>
+      <a:accent2>
+        <a:srgbClr val="ED7D31"/>
+      </a:accent2>
+      <a:accent3>
+        <a:srgbClr val="A5A5A5"/>
+      </a:accent3>
+      <a:accent4>
+        <a:srgbClr val="FFC000"/>
+      </a:accent4>
+      <a:accent5>
+        <a:srgbClr val="5B9BD5"/>
+      </a:accent5>
+      <a:accent6>
+        <a:srgbClr val="70AD47"/>
+      </a:accent6>
+      <a:hlink>
+        <a:srgbClr val="0563C1"/>
+      </a:hlink>
+      <a:folHlink>
+        <a:srgbClr val="954F72"/>
+      </a:folHlink>
+    </a:clrScheme>
+    <a:fontScheme name="Office">
+      <a:majorFont>
+        <a:latin typeface="Calibri Light" panose="020F0302020204030204"/>
+        <a:ea typeface=""/>
+        <a:cs typeface=""/>
+        <a:font script="Jpan" typeface="游ゴシック Light"/>
+        <a:font script="Hang" typeface="맑은 고딕"/>
+        <a:font script="Hans" typeface="等线 Light"/>
+        <a:font script="Hant" typeface="新細明體"/>
+        <a:font script="Arab" typeface="Times New Roman"/>
+        <a:font script="Hebr" typeface="Times New Roman"/>
+        <a:font script="Thai" typeface="Angsana New"/>
+        <a:font script="Ethi" typeface="Nyala"/>
+        <a:font script="Beng" typeface="Vrinda"/>
+        <a:font script="Gujr" typeface="Shruti"/>
+        <a:font script="Khmr" typeface="MoolBoran"/>
+        <a:font script="Knda" typeface="Tunga"/>
+        <a:font script="Guru" typeface="Raavi"/>
+        <a:font script="Cans" typeface="Euphemia"/>
+        <a:font script="Cher" typeface="Plantagenet Cherokee"/>
+        <a:font script="Yiii" typeface="Microsoft Yi Baiti"/>
+        <a:font script="Tibt" typeface="Microsoft Himalaya"/>
+        <a:font script="Thaa" typeface="MV Boli"/>
+        <a:font script="Deva" typeface="Mangal"/>
+        <a:font script="Telu" typeface="Gautami"/>
+        <a:font script="Taml" typeface="Latha"/>
+        <a:font script="Syrc" typeface="Estrangelo Edessa"/>
+        <a:font script="Orya" typeface="Kalinga"/>
+        <a:font script="Mlym" typeface="Kartika"/>
+        <a:font script="Laoo" typeface="DokChampa"/>
+        <a:font script="Sinh" typeface="Iskoola Pota"/>
+        <a:font script="Mong" typeface="Mongolian Baiti"/>
+        <a:font script="Viet" typeface="Times New Roman"/>
+        <a:font script="Uigh" typeface="Microsoft Uighur"/>
+        <a:font script="Geor" typeface="Sylfaen"/>
+        <a:font script="Armn" typeface="Arial"/>
+        <a:font script="Bugi" typeface="Leelawadee UI"/>
+        <a:font script="Bopo" typeface="Microsoft JhengHei"/>
+        <a:font script="Java" typeface="Javanese Text"/>
+        <a:font script="Lisu" typeface="Segoe UI"/>
+        <a:font script="Mymr" typeface="Myanmar Text"/>
+        <a:font script="Nkoo" typeface="Ebrima"/>
+        <a:font script="Olck" typeface="Nirmala UI"/>
+        <a:font script="Osma" typeface="Ebrima"/>
+        <a:font script="Phag" typeface="Phagspa"/>
+        <a:font script="Syrn" typeface="Estrangelo Edessa"/>
+        <a:font script="Syrj" typeface="Estrangelo Edessa"/>
+        <a:font script="Syre" typeface="Estrangelo Edessa"/>
+        <a:font script="Sora" typeface="Nirmala UI"/>
+        <a:font script="Tale" typeface="Microsoft Tai Le"/>
+        <a:font script="Talu" typeface="Microsoft New Tai Lue"/>
+        <a:font script="Tfng" typeface="Ebrima"/>
+      </a:majorFont>
+      <a:minorFont>
+        <a:latin typeface="Calibri" panose="020F0502020204030204"/>
+        <a:ea typeface=""/>
+        <a:cs typeface=""/>
+        <a:font script="Jpan" typeface="游ゴシック"/>
+        <a:font script="Hang" typeface="맑은 고딕"/>
+        <a:font script="Hans" typeface="等线"/>
+        <a:font script="Hant" typeface="新細明體"/>
+        <a:font script="Arab" typeface="Arial"/>
+        <a:font script="Hebr" typeface="Arial"/>
+        <a:font script="Thai" typeface="Cordia New"/>
+        <a:font script="Ethi" typeface="Nyala"/>
+        <a:font script="Beng" typeface="Vrinda"/>
+        <a:font script="Gujr" typeface="Shruti"/>
+        <a:font script="Khmr" typeface="DaunPenh"/>
+        <a:font script="Knda" typeface="Tunga"/>
+        <a:font script="Guru" typeface="Raavi"/>
+        <a:font script="Cans" typeface="Euphemia"/>
+        <a:font script="Cher" typeface="Plantagenet Cherokee"/>
+        <a:font script="Yiii" typeface="Microsoft Yi Baiti"/>
+        <a:font script="Tibt" typeface="Microsoft Himalaya"/>
+        <a:font script="Thaa" typeface="MV Boli"/>
+        <a:font script="Deva" typeface="Mangal"/>
+        <a:font script="Telu" typeface="Gautami"/>
+        <a:font script="Taml" typeface="Latha"/>
+        <a:font script="Syrc" typeface="Estrangelo Edessa"/>
+        <a:font script="Orya" typeface="Kalinga"/>
+        <a:font script="Mlym" typeface="Kartika"/>
+        <a:font script="Laoo" typeface="DokChampa"/>
+        <a:font script="Sinh" typeface="Iskoola Pota"/>
+        <a:font script="Mong" typeface="Mongolian Baiti"/>
+        <a:font script="Viet" typeface="Arial"/>
+        <a:font script="Uigh" typeface="Microsoft Uighur"/>
+        <a:font script="Geor" typeface="Sylfaen"/>
+        <a:font script="Armn" typeface="Arial"/>
+        <a:font script="Bugi" typeface="Leelawadee UI"/>
+        <a:font script="Bopo" typeface="Microsoft JhengHei"/>
+        <a:font script="Java" typeface="Javanese Text"/>
+        <a:font script="Lisu" typeface="Segoe UI"/>
+        <a:font script="Mymr" typeface="Myanmar Text"/>
+        <a:font script="Nkoo" typeface="Ebrima"/>
+        <a:font script="Olck" typeface="Nirmala UI"/>
+        <a:font script="Osma" typeface="Ebrima"/>
+        <a:font script="Phag" typeface="Phagspa"/>
+        <a:font script="Syrn" typeface="Estrangelo Edessa"/>
+        <a:font script="Syrj" typeface="Estrangelo Edessa"/>
+        <a:font script="Syre" typeface="Estrangelo Edessa"/>
+        <a:font script="Sora" typeface="Nirmala UI"/>
+        <a:font script="Tale" typeface="Microsoft Tai Le"/>
+        <a:font script="Talu" typeface="Microsoft New Tai Lue"/>
+        <a:font script="Tfng" typeface="Ebrima"/>
+      </a:minorFont>
+    </a:fontScheme>
+    <a:fmtScheme name="Office">
+      <a:fillStyleLst>
+        <a:solidFill>
+          <a:schemeClr val="phClr"/>
+        </a:solidFill>
+        <a:gradFill rotWithShape="1">
+          <a:gsLst>
+            <a:gs pos="0">
+              <a:schemeClr val="phClr">
+                <a:lumMod val="110000"/>
+                <a:satMod val="105000"/>
+                <a:tint val="67000"/>
+              </a:schemeClr>
+            </a:gs>
+            <a:gs pos="50000">
+              <a:schemeClr val="phClr">
+                <a:lumMod val="105000"/>
+                <a:satMod val="103000"/>
+                <a:tint val="73000"/>
+              </a:schemeClr>
+            </a:gs>
+            <a:gs pos="100000">
+              <a:schemeClr val="phClr">
+                <a:lumMod val="105000"/>
+                <a:satMod val="109000"/>
+                <a:tint val="81000"/>
+              </a:schemeClr>
+            </a:gs>
+          </a:gsLst>
+          <a:lin ang="5400000" scaled="0"/>
+        </a:gradFill>
+        <a:gradFill rotWithShape="1">
+          <a:gsLst>
+            <a:gs pos="0">
+              <a:schemeClr val="phClr">
+                <a:satMod val="103000"/>
+                <a:lumMod val="102000"/>
+                <a:tint val="94000"/>
+              </a:schemeClr>
+            </a:gs>
+            <a:gs pos="50000">
+              <a:schemeClr val="phClr">
+                <a:satMod val="110000"/>
+                <a:lumMod val="100000"/>
+                <a:shade val="100000"/>
+              </a:schemeClr>
+            </a:gs>
+            <a:gs pos="100000">
+              <a:schemeClr val="phClr">
+                <a:lumMod val="99000"/>
+                <a:satMod val="120000"/>
+                <a:shade val="78000"/>
+              </a:schemeClr>
+            </a:gs>
+          </a:gsLst>
+          <a:lin ang="5400000" scaled="0"/>
+        </a:gradFill>
+      </a:fillStyleLst>
+      <a:lnStyleLst>
+        <a:ln w="6350" cap="flat" cmpd="sng" algn="ctr">
+          <a:solidFill>
+            <a:schemeClr val="phClr"/>
+          </a:solidFill>
+          <a:prstDash val="solid"/>
+          <a:miter lim="800000"/>
+        </a:ln>
+        <a:ln w="12700" cap="flat" cmpd="sng" algn="ctr">
+          <a:solidFill>
+            <a:schemeClr val="phClr"/>
+          </a:solidFill>
+          <a:prstDash val="solid"/>
+          <a:miter lim="800000"/>
+        </a:ln>
+        <a:ln w="19050" cap="flat" cmpd="sng" algn="ctr">
+          <a:solidFill>
+            <a:schemeClr val="phClr"/>
+          </a:solidFill>
+          <a:prstDash val="solid"/>
+          <a:miter lim="800000"/>
+        </a:ln>
+      </a:lnStyleLst>
+      <a:effectStyleLst>
+        <a:effectStyle>
+          <a:effectLst/>
+        </a:effectStyle>
+        <a:effectStyle>
+          <a:effectLst/>
+        </a:effectStyle>
+        <a:effectStyle>
+          <a:effectLst>
+            <a:outerShdw blurRad="57150" dist="19050" dir="5400000" algn="ctr" rotWithShape="0">
+              <a:srgbClr val="000000">
+                <a:alpha val="63000"/>
+              </a:srgbClr>
+            </a:outerShdw>
+          </a:effectLst>
+        </a:effectStyle>
+      </a:effectStyleLst>
+      <a:bgFillStyleLst>
+        <a:solidFill>
+          <a:schemeClr val="phClr"/>
+        </a:solidFill>
+        <a:solidFill>
+          <a:schemeClr val="phClr">
+            <a:tint val="95000"/>
+            <a:satMod val="170000"/>
+          </a:schemeClr>
+        </a:solidFill>
+        <a:gradFill rotWithShape="1">
+          <a:gsLst>
+            <a:gs pos="0">
+              <a:schemeClr val="phClr">
+                <a:tint val="93000"/>
+                <a:satMod val="150000"/>
+                <a:shade val="98000"/>
+                <a:lumMod val="102000"/>
+              </a:schemeClr>
+            </a:gs>
+            <a:gs pos="50000">
+              <a:schemeClr val="phClr">
+                <a:tint val="98000"/>
+                <a:satMod val="130000"/>
+                <a:shade val="90000"/>
+                <a:lumMod val="103000"/>
+              </a:schemeClr>
+            </a:gs>
+            <a:gs pos="100000">
+              <a:schemeClr val="phClr">
+                <a:shade val="63000"/>
+                <a:satMod val="120000"/>
+              </a:schemeClr>
+            </a:gs>
+          </a:gsLst>
+          <a:lin ang="5400000" scaled="0"/>
+        </a:gradFill>
+      </a:bgFillStyleLst>
+    </a:fmtScheme>
+  </a:themeElements>
+  <a:objectDefaults/>
+  <a:extraClrSchemeLst/>
+  <a:extLst>
+    <a:ext uri="{05A4C25C-085E-4340-85A3-A5531E510DB2}">
+      <thm15:themeFamily xmlns:thm15="http://schemas.microsoft.com/office/thememl/2012/main" name="Office Theme" id="{62F939B6-93AF-4DB8-9C6B-D6C7DFDC589F}" vid="{4A3C46E8-61CC-4603-A589-7422A47A8E4A}"/>
+    </a:ext>
+  </a:extLst>
+</a:theme>
 </file>
</xml_diff>

<commit_message>
Post-FBLA Updates to Cross Wordle
</commit_message>
<xml_diff>
--- a/projects/crosswordle2/CrossWordle Presentation.pptx
+++ b/projects/crosswordle2/CrossWordle Presentation.pptx
@@ -218,7 +218,7 @@
           <a:p>
             <a:fld id="{2F4773D6-586D-CC45-9097-85C9C8AD8DB1}" type="datetimeFigureOut">
               <a:rPr lang="en-US" smtClean="0"/>
-              <a:t>6/27/23</a:t>
+              <a:t>6/28/23</a:t>
             </a:fld>
             <a:endParaRPr lang="en-US"/>
           </a:p>
@@ -716,7 +716,7 @@
           <a:p>
             <a:fld id="{965FD8D6-C471-4C27-8953-0AF5992EEF52}" type="datetimeFigureOut">
               <a:rPr lang="en-US" smtClean="0"/>
-              <a:t>6/27/23</a:t>
+              <a:t>6/28/23</a:t>
             </a:fld>
             <a:endParaRPr lang="en-US"/>
           </a:p>
@@ -914,7 +914,7 @@
           <a:p>
             <a:fld id="{965FD8D6-C471-4C27-8953-0AF5992EEF52}" type="datetimeFigureOut">
               <a:rPr lang="en-US" smtClean="0"/>
-              <a:t>6/27/23</a:t>
+              <a:t>6/28/23</a:t>
             </a:fld>
             <a:endParaRPr lang="en-US"/>
           </a:p>
@@ -1122,7 +1122,7 @@
           <a:p>
             <a:fld id="{965FD8D6-C471-4C27-8953-0AF5992EEF52}" type="datetimeFigureOut">
               <a:rPr lang="en-US" smtClean="0"/>
-              <a:t>6/27/23</a:t>
+              <a:t>6/28/23</a:t>
             </a:fld>
             <a:endParaRPr lang="en-US"/>
           </a:p>
@@ -1320,7 +1320,7 @@
           <a:p>
             <a:fld id="{965FD8D6-C471-4C27-8953-0AF5992EEF52}" type="datetimeFigureOut">
               <a:rPr lang="en-US" smtClean="0"/>
-              <a:t>6/27/23</a:t>
+              <a:t>6/28/23</a:t>
             </a:fld>
             <a:endParaRPr lang="en-US"/>
           </a:p>
@@ -1595,7 +1595,7 @@
           <a:p>
             <a:fld id="{965FD8D6-C471-4C27-8953-0AF5992EEF52}" type="datetimeFigureOut">
               <a:rPr lang="en-US" smtClean="0"/>
-              <a:t>6/27/23</a:t>
+              <a:t>6/28/23</a:t>
             </a:fld>
             <a:endParaRPr lang="en-US"/>
           </a:p>
@@ -1860,7 +1860,7 @@
           <a:p>
             <a:fld id="{965FD8D6-C471-4C27-8953-0AF5992EEF52}" type="datetimeFigureOut">
               <a:rPr lang="en-US" smtClean="0"/>
-              <a:t>6/27/23</a:t>
+              <a:t>6/28/23</a:t>
             </a:fld>
             <a:endParaRPr lang="en-US"/>
           </a:p>
@@ -2272,7 +2272,7 @@
           <a:p>
             <a:fld id="{965FD8D6-C471-4C27-8953-0AF5992EEF52}" type="datetimeFigureOut">
               <a:rPr lang="en-US" smtClean="0"/>
-              <a:t>6/27/23</a:t>
+              <a:t>6/28/23</a:t>
             </a:fld>
             <a:endParaRPr lang="en-US"/>
           </a:p>
@@ -2413,7 +2413,7 @@
           <a:p>
             <a:fld id="{965FD8D6-C471-4C27-8953-0AF5992EEF52}" type="datetimeFigureOut">
               <a:rPr lang="en-US" smtClean="0"/>
-              <a:t>6/27/23</a:t>
+              <a:t>6/28/23</a:t>
             </a:fld>
             <a:endParaRPr lang="en-US"/>
           </a:p>
@@ -2526,7 +2526,7 @@
           <a:p>
             <a:fld id="{965FD8D6-C471-4C27-8953-0AF5992EEF52}" type="datetimeFigureOut">
               <a:rPr lang="en-US" smtClean="0"/>
-              <a:t>6/27/23</a:t>
+              <a:t>6/28/23</a:t>
             </a:fld>
             <a:endParaRPr lang="en-US"/>
           </a:p>
@@ -2837,7 +2837,7 @@
           <a:p>
             <a:fld id="{965FD8D6-C471-4C27-8953-0AF5992EEF52}" type="datetimeFigureOut">
               <a:rPr lang="en-US" smtClean="0"/>
-              <a:t>6/27/23</a:t>
+              <a:t>6/28/23</a:t>
             </a:fld>
             <a:endParaRPr lang="en-US"/>
           </a:p>
@@ -3125,7 +3125,7 @@
           <a:p>
             <a:fld id="{965FD8D6-C471-4C27-8953-0AF5992EEF52}" type="datetimeFigureOut">
               <a:rPr lang="en-US" smtClean="0"/>
-              <a:t>6/27/23</a:t>
+              <a:t>6/28/23</a:t>
             </a:fld>
             <a:endParaRPr lang="en-US"/>
           </a:p>
@@ -3366,7 +3366,7 @@
           <a:p>
             <a:fld id="{965FD8D6-C471-4C27-8953-0AF5992EEF52}" type="datetimeFigureOut">
               <a:rPr lang="en-US" smtClean="0"/>
-              <a:t>6/27/23</a:t>
+              <a:t>6/28/23</a:t>
             </a:fld>
             <a:endParaRPr lang="en-US"/>
           </a:p>
@@ -7462,7 +7462,7 @@
                 <a:latin typeface="Arial" panose="020B0604020202020204" pitchFamily="34" charset="0"/>
                 <a:cs typeface="Arial" panose="020B0604020202020204" pitchFamily="34" charset="0"/>
               </a:rPr>
-              <a:t>Example 1</a:t>
+              <a:t>First Attempt</a:t>
             </a:r>
           </a:p>
         </p:txBody>
@@ -7897,15 +7897,22 @@
           <a:p>
             <a:pPr algn="ctr"/>
             <a:r>
-              <a:rPr lang="en-US" sz="6600" b="1" kern="1200" dirty="0">
+              <a:rPr lang="en-US" sz="6600" b="1" dirty="0">
                 <a:solidFill>
                   <a:schemeClr val="bg1"/>
                 </a:solidFill>
                 <a:latin typeface="Arial" panose="020B0604020202020204" pitchFamily="34" charset="0"/>
                 <a:cs typeface="Arial" panose="020B0604020202020204" pitchFamily="34" charset="0"/>
               </a:rPr>
-              <a:t>If-Else Tree Example</a:t>
-            </a:r>
+              <a:t>Original Code</a:t>
+            </a:r>
+            <a:endParaRPr lang="en-US" sz="6600" b="1" kern="1200" dirty="0">
+              <a:solidFill>
+                <a:schemeClr val="bg1"/>
+              </a:solidFill>
+              <a:latin typeface="Arial" panose="020B0604020202020204" pitchFamily="34" charset="0"/>
+              <a:cs typeface="Arial" panose="020B0604020202020204" pitchFamily="34" charset="0"/>
+            </a:endParaRPr>
           </a:p>
         </p:txBody>
       </p:sp>
@@ -8424,7 +8431,7 @@
                 <a:latin typeface="Arial" panose="020B0604020202020204" pitchFamily="34" charset="0"/>
                 <a:cs typeface="Arial" panose="020B0604020202020204" pitchFamily="34" charset="0"/>
               </a:rPr>
-              <a:t>Code Snippet</a:t>
+              <a:t>Final Code</a:t>
             </a:r>
           </a:p>
         </p:txBody>
@@ -8593,7 +8600,7 @@
                 <a:latin typeface="Arial" panose="020B0604020202020204" pitchFamily="34" charset="0"/>
                 <a:cs typeface="Arial" panose="020B0604020202020204" pitchFamily="34" charset="0"/>
               </a:rPr>
-              <a:t>Example 2</a:t>
+              <a:t>Final Product</a:t>
             </a:r>
           </a:p>
         </p:txBody>
@@ -10276,98 +10283,6 @@
   <p:clrMapOvr>
     <a:masterClrMapping/>
   </p:clrMapOvr>
-  <p:timing>
-    <p:tnLst>
-      <p:par>
-        <p:cTn id="1" dur="indefinite" restart="never" nodeType="tmRoot">
-          <p:childTnLst>
-            <p:seq concurrent="1" nextAc="seek">
-              <p:cTn id="2" dur="indefinite" nodeType="mainSeq">
-                <p:childTnLst>
-                  <p:par>
-                    <p:cTn id="3" fill="hold">
-                      <p:stCondLst>
-                        <p:cond delay="indefinite"/>
-                        <p:cond evt="onBegin" delay="0">
-                          <p:tn val="2"/>
-                        </p:cond>
-                      </p:stCondLst>
-                      <p:childTnLst>
-                        <p:par>
-                          <p:cTn id="4" fill="hold">
-                            <p:stCondLst>
-                              <p:cond delay="0"/>
-                            </p:stCondLst>
-                            <p:childTnLst>
-                              <p:par>
-                                <p:cTn id="5" presetID="10" presetClass="entr" presetSubtype="0" fill="hold" grpId="0" nodeType="withEffect">
-                                  <p:stCondLst>
-                                    <p:cond delay="1000"/>
-                                  </p:stCondLst>
-                                  <p:iterate>
-                                    <p:tmPct val="10000"/>
-                                  </p:iterate>
-                                  <p:childTnLst>
-                                    <p:set>
-                                      <p:cBhvr>
-                                        <p:cTn id="6" dur="1" fill="hold">
-                                          <p:stCondLst>
-                                            <p:cond delay="0"/>
-                                          </p:stCondLst>
-                                        </p:cTn>
-                                        <p:tgtEl>
-                                          <p:spTgt spid="2"/>
-                                        </p:tgtEl>
-                                        <p:attrNameLst>
-                                          <p:attrName>style.visibility</p:attrName>
-                                        </p:attrNameLst>
-                                      </p:cBhvr>
-                                      <p:to>
-                                        <p:strVal val="visible"/>
-                                      </p:to>
-                                    </p:set>
-                                    <p:animEffect transition="in" filter="fade">
-                                      <p:cBhvr>
-                                        <p:cTn id="7" dur="700"/>
-                                        <p:tgtEl>
-                                          <p:spTgt spid="2"/>
-                                        </p:tgtEl>
-                                      </p:cBhvr>
-                                    </p:animEffect>
-                                  </p:childTnLst>
-                                </p:cTn>
-                              </p:par>
-                            </p:childTnLst>
-                          </p:cTn>
-                        </p:par>
-                      </p:childTnLst>
-                    </p:cTn>
-                  </p:par>
-                </p:childTnLst>
-              </p:cTn>
-              <p:prevCondLst>
-                <p:cond evt="onPrev" delay="0">
-                  <p:tgtEl>
-                    <p:sldTgt/>
-                  </p:tgtEl>
-                </p:cond>
-              </p:prevCondLst>
-              <p:nextCondLst>
-                <p:cond evt="onNext" delay="0">
-                  <p:tgtEl>
-                    <p:sldTgt/>
-                  </p:tgtEl>
-                </p:cond>
-              </p:nextCondLst>
-            </p:seq>
-          </p:childTnLst>
-        </p:cTn>
-      </p:par>
-    </p:tnLst>
-    <p:bldLst>
-      <p:bldP spid="2" grpId="0"/>
-    </p:bldLst>
-  </p:timing>
 </p:sld>
 </file>
 
@@ -10922,7 +10837,7 @@
 </file>
 
 <file path=ppt/slides/slide20.xml><?xml version="1.0" encoding="utf-8"?>
-<p:sld xmlns:a="http://schemas.openxmlformats.org/drawingml/2006/main" xmlns:r="http://schemas.openxmlformats.org/officeDocument/2006/relationships" xmlns:p="http://schemas.openxmlformats.org/presentationml/2006/main" show="0">
+<p:sld xmlns:a="http://schemas.openxmlformats.org/drawingml/2006/main" xmlns:r="http://schemas.openxmlformats.org/officeDocument/2006/relationships" xmlns:p="http://schemas.openxmlformats.org/presentationml/2006/main">
   <p:cSld>
     <p:bg>
       <p:bgPr>

</xml_diff>